<commit_message>
Small fixes to some
git-svn-id: http://dminfo:8686/svn/repository/models/branches/dsm2_distribute_v8_0@1535 cdc4813b-4270-ec4f-936e-925f93a782c2

Former-commit-id: f697bf41130ac29f5b25071102d992c388db3bbc
</commit_message>
<xml_diff>
--- a/dsm2/presentations/p3_input_system_layering.pptx
+++ b/dsm2/presentations/p3_input_system_layering.pptx
@@ -5,10 +5,10 @@
     <p:sldMasterId id="2147483648" r:id="rId1"/>
   </p:sldMasterIdLst>
   <p:notesMasterIdLst>
-    <p:notesMasterId r:id="rId15"/>
+    <p:notesMasterId r:id="rId16"/>
   </p:notesMasterIdLst>
   <p:handoutMasterIdLst>
-    <p:handoutMasterId r:id="rId16"/>
+    <p:handoutMasterId r:id="rId17"/>
   </p:handoutMasterIdLst>
   <p:sldIdLst>
     <p:sldId id="429" r:id="rId2"/>
@@ -19,11 +19,12 @@
     <p:sldId id="432" r:id="rId7"/>
     <p:sldId id="433" r:id="rId8"/>
     <p:sldId id="446" r:id="rId9"/>
-    <p:sldId id="439" r:id="rId10"/>
-    <p:sldId id="445" r:id="rId11"/>
-    <p:sldId id="440" r:id="rId12"/>
-    <p:sldId id="441" r:id="rId13"/>
-    <p:sldId id="437" r:id="rId14"/>
+    <p:sldId id="448" r:id="rId10"/>
+    <p:sldId id="439" r:id="rId11"/>
+    <p:sldId id="445" r:id="rId12"/>
+    <p:sldId id="440" r:id="rId13"/>
+    <p:sldId id="441" r:id="rId14"/>
+    <p:sldId id="437" r:id="rId15"/>
   </p:sldIdLst>
   <p:sldSz cx="9144000" cy="6858000" type="screen4x3"/>
   <p:notesSz cx="7010400" cy="9296400"/>
@@ -4374,6 +4375,414 @@
       </p:grpSpPr>
       <p:sp>
         <p:nvSpPr>
+          <p:cNvPr id="29697" name="Rectangle 2"/>
+          <p:cNvSpPr>
+            <a:spLocks noGrp="1" noChangeArrowheads="1"/>
+          </p:cNvSpPr>
+          <p:nvPr>
+            <p:ph type="title"/>
+          </p:nvPr>
+        </p:nvSpPr>
+        <p:spPr>
+          <a:xfrm>
+            <a:off x="685800" y="323850"/>
+            <a:ext cx="7870825" cy="1143000"/>
+          </a:xfrm>
+        </p:spPr>
+        <p:txBody>
+          <a:bodyPr/>
+          <a:lstStyle/>
+          <a:p>
+            <a:r>
+              <a:rPr lang="en-US" smtClean="0"/>
+              <a:t>ENVVAR: Text Substitution</a:t>
+            </a:r>
+          </a:p>
+        </p:txBody>
+      </p:sp>
+      <p:sp>
+        <p:nvSpPr>
+          <p:cNvPr id="29698" name="Rectangle 3"/>
+          <p:cNvSpPr>
+            <a:spLocks noGrp="1" noChangeArrowheads="1"/>
+          </p:cNvSpPr>
+          <p:nvPr>
+            <p:ph type="body" idx="1"/>
+          </p:nvPr>
+        </p:nvSpPr>
+        <p:spPr>
+          <a:xfrm>
+            <a:off x="300038" y="1362075"/>
+            <a:ext cx="8664575" cy="5059363"/>
+          </a:xfrm>
+        </p:spPr>
+        <p:txBody>
+          <a:bodyPr/>
+          <a:lstStyle/>
+          <a:p>
+            <a:pPr>
+              <a:lnSpc>
+                <a:spcPct val="80000"/>
+              </a:lnSpc>
+            </a:pPr>
+            <a:r>
+              <a:rPr lang="en-US" sz="2600" smtClean="0"/>
+              <a:t>Used for flexibility…avoids multiple files and erasing</a:t>
+            </a:r>
+          </a:p>
+          <a:p>
+            <a:pPr>
+              <a:lnSpc>
+                <a:spcPct val="80000"/>
+              </a:lnSpc>
+            </a:pPr>
+            <a:r>
+              <a:rPr lang="en-US" sz="2600" smtClean="0"/>
+              <a:t>Define in ENVVAR table (or OS environment):</a:t>
+            </a:r>
+          </a:p>
+          <a:p>
+            <a:pPr>
+              <a:lnSpc>
+                <a:spcPct val="80000"/>
+              </a:lnSpc>
+            </a:pPr>
+            <a:endParaRPr lang="en-US" sz="2600" smtClean="0"/>
+          </a:p>
+          <a:p>
+            <a:pPr>
+              <a:lnSpc>
+                <a:spcPct val="80000"/>
+              </a:lnSpc>
+            </a:pPr>
+            <a:endParaRPr lang="en-US" sz="2600" smtClean="0"/>
+          </a:p>
+          <a:p>
+            <a:pPr>
+              <a:lnSpc>
+                <a:spcPct val="80000"/>
+              </a:lnSpc>
+            </a:pPr>
+            <a:endParaRPr lang="en-US" sz="2600" smtClean="0"/>
+          </a:p>
+          <a:p>
+            <a:pPr>
+              <a:lnSpc>
+                <a:spcPct val="80000"/>
+              </a:lnSpc>
+            </a:pPr>
+            <a:endParaRPr lang="en-US" sz="2600" smtClean="0"/>
+          </a:p>
+          <a:p>
+            <a:pPr>
+              <a:lnSpc>
+                <a:spcPct val="80000"/>
+              </a:lnSpc>
+            </a:pPr>
+            <a:endParaRPr lang="en-US" sz="2600" smtClean="0"/>
+          </a:p>
+          <a:p>
+            <a:pPr>
+              <a:lnSpc>
+                <a:spcPct val="80000"/>
+              </a:lnSpc>
+            </a:pPr>
+            <a:endParaRPr lang="en-US" sz="2600" smtClean="0"/>
+          </a:p>
+          <a:p>
+            <a:pPr>
+              <a:lnSpc>
+                <a:spcPct val="80000"/>
+              </a:lnSpc>
+            </a:pPr>
+            <a:endParaRPr lang="en-US" sz="2600" smtClean="0"/>
+          </a:p>
+          <a:p>
+            <a:pPr>
+              <a:lnSpc>
+                <a:spcPct val="80000"/>
+              </a:lnSpc>
+            </a:pPr>
+            <a:r>
+              <a:rPr lang="en-US" sz="2600" smtClean="0"/>
+              <a:t>Subject to layering</a:t>
+            </a:r>
+          </a:p>
+          <a:p>
+            <a:pPr>
+              <a:lnSpc>
+                <a:spcPct val="80000"/>
+              </a:lnSpc>
+            </a:pPr>
+            <a:r>
+              <a:rPr lang="en-US" sz="2600" smtClean="0"/>
+              <a:t>Use anywhere else using ${ }:   </a:t>
+            </a:r>
+          </a:p>
+          <a:p>
+            <a:pPr>
+              <a:lnSpc>
+                <a:spcPct val="80000"/>
+              </a:lnSpc>
+            </a:pPr>
+            <a:r>
+              <a:rPr lang="en-US" sz="2600" smtClean="0"/>
+              <a:t>Nesting and interdependency allowed.</a:t>
+            </a:r>
+          </a:p>
+          <a:p>
+            <a:pPr>
+              <a:lnSpc>
+                <a:spcPct val="80000"/>
+              </a:lnSpc>
+            </a:pPr>
+            <a:endParaRPr lang="en-US" sz="2600" smtClean="0"/>
+          </a:p>
+          <a:p>
+            <a:pPr>
+              <a:lnSpc>
+                <a:spcPct val="80000"/>
+              </a:lnSpc>
+            </a:pPr>
+            <a:endParaRPr lang="en-US" sz="2600" smtClean="0"/>
+          </a:p>
+          <a:p>
+            <a:pPr>
+              <a:lnSpc>
+                <a:spcPct val="80000"/>
+              </a:lnSpc>
+              <a:buFontTx/>
+              <a:buNone/>
+            </a:pPr>
+            <a:endParaRPr lang="en-US" sz="2400" smtClean="0"/>
+          </a:p>
+        </p:txBody>
+      </p:sp>
+      <p:sp>
+        <p:nvSpPr>
+          <p:cNvPr id="29699" name="Rectangle 4"/>
+          <p:cNvSpPr>
+            <a:spLocks noChangeArrowheads="1"/>
+          </p:cNvSpPr>
+          <p:nvPr/>
+        </p:nvSpPr>
+        <p:spPr bwMode="auto">
+          <a:xfrm>
+            <a:off x="1455738" y="2981325"/>
+            <a:ext cx="4572000" cy="641350"/>
+          </a:xfrm>
+          <a:prstGeom prst="rect">
+            <a:avLst/>
+          </a:prstGeom>
+          <a:noFill/>
+          <a:ln w="9525">
+            <a:noFill/>
+            <a:miter lim="800000"/>
+            <a:headEnd/>
+            <a:tailEnd/>
+          </a:ln>
+        </p:spPr>
+        <p:txBody>
+          <a:bodyPr>
+            <a:spAutoFit/>
+          </a:bodyPr>
+          <a:lstStyle/>
+          <a:p>
+            <a:pPr marL="685800" indent="-685800"/>
+            <a:endParaRPr lang="en-US"/>
+          </a:p>
+        </p:txBody>
+      </p:sp>
+      <p:sp>
+        <p:nvSpPr>
+          <p:cNvPr id="29700" name="Rectangle 5"/>
+          <p:cNvSpPr>
+            <a:spLocks noChangeArrowheads="1"/>
+          </p:cNvSpPr>
+          <p:nvPr/>
+        </p:nvSpPr>
+        <p:spPr bwMode="auto">
+          <a:xfrm>
+            <a:off x="1019175" y="2262188"/>
+            <a:ext cx="7448550" cy="2436812"/>
+          </a:xfrm>
+          <a:prstGeom prst="rect">
+            <a:avLst/>
+          </a:prstGeom>
+          <a:solidFill>
+            <a:srgbClr val="CCFFCC"/>
+          </a:solidFill>
+          <a:ln w="9525">
+            <a:noFill/>
+            <a:miter lim="800000"/>
+            <a:headEnd/>
+            <a:tailEnd/>
+          </a:ln>
+        </p:spPr>
+        <p:txBody>
+          <a:bodyPr>
+            <a:spAutoFit/>
+          </a:bodyPr>
+          <a:lstStyle/>
+          <a:p>
+            <a:pPr marL="685800" indent="-685800"/>
+            <a:r>
+              <a:rPr lang="en-US" sz="2200">
+                <a:solidFill>
+                  <a:schemeClr val="bg2"/>
+                </a:solidFill>
+                <a:latin typeface="Courier New" pitchFamily="49" charset="0"/>
+              </a:rPr>
+              <a:t>ENVVAR</a:t>
+            </a:r>
+          </a:p>
+          <a:p>
+            <a:pPr marL="685800" indent="-685800"/>
+            <a:r>
+              <a:rPr lang="en-US" sz="2200">
+                <a:solidFill>
+                  <a:schemeClr val="bg2"/>
+                </a:solidFill>
+                <a:latin typeface="Courier New" pitchFamily="49" charset="0"/>
+              </a:rPr>
+              <a:t>NAME             VALUE</a:t>
+            </a:r>
+          </a:p>
+          <a:p>
+            <a:pPr marL="685800" indent="-685800"/>
+            <a:r>
+              <a:rPr lang="en-US" sz="2200">
+                <a:solidFill>
+                  <a:schemeClr val="bg2"/>
+                </a:solidFill>
+                <a:latin typeface="Courier New" pitchFamily="49" charset="0"/>
+              </a:rPr>
+              <a:t>DSM2INPUTDIR     ${DSM2_HOME}/common_input</a:t>
+            </a:r>
+          </a:p>
+          <a:p>
+            <a:pPr marL="685800" indent="-685800"/>
+            <a:r>
+              <a:rPr lang="en-US" sz="2200">
+                <a:solidFill>
+                  <a:schemeClr val="bg2"/>
+                </a:solidFill>
+                <a:latin typeface="Courier New" pitchFamily="49" charset="0"/>
+              </a:rPr>
+              <a:t>START_DATE       01JAN1990</a:t>
+            </a:r>
+          </a:p>
+          <a:p>
+            <a:pPr marL="685800" indent="-685800"/>
+            <a:r>
+              <a:rPr lang="en-US" sz="2200">
+                <a:solidFill>
+                  <a:schemeClr val="bg2"/>
+                </a:solidFill>
+                <a:latin typeface="Courier New" pitchFamily="49" charset="0"/>
+              </a:rPr>
+              <a:t>STUDYDIR         .</a:t>
+            </a:r>
+          </a:p>
+          <a:p>
+            <a:pPr marL="685800" indent="-685800"/>
+            <a:r>
+              <a:rPr lang="en-US" sz="2200">
+                <a:solidFill>
+                  <a:schemeClr val="bg2"/>
+                </a:solidFill>
+                <a:latin typeface="Courier New" pitchFamily="49" charset="0"/>
+              </a:rPr>
+              <a:t>OUTPUT           ${STUDYDIR}/output</a:t>
+            </a:r>
+          </a:p>
+          <a:p>
+            <a:pPr marL="685800" indent="-685800"/>
+            <a:r>
+              <a:rPr lang="en-US" sz="2200">
+                <a:solidFill>
+                  <a:schemeClr val="bg2"/>
+                </a:solidFill>
+                <a:latin typeface="Courier New" pitchFamily="49" charset="0"/>
+              </a:rPr>
+              <a:t>END</a:t>
+            </a:r>
+          </a:p>
+        </p:txBody>
+      </p:sp>
+      <p:sp>
+        <p:nvSpPr>
+          <p:cNvPr id="29701" name="Text Box 6"/>
+          <p:cNvSpPr txBox="1">
+            <a:spLocks noChangeArrowheads="1"/>
+          </p:cNvSpPr>
+          <p:nvPr/>
+        </p:nvSpPr>
+        <p:spPr bwMode="auto">
+          <a:xfrm>
+            <a:off x="5357813" y="5330825"/>
+            <a:ext cx="2927350" cy="427038"/>
+          </a:xfrm>
+          <a:prstGeom prst="rect">
+            <a:avLst/>
+          </a:prstGeom>
+          <a:solidFill>
+            <a:srgbClr val="CCFFCC"/>
+          </a:solidFill>
+          <a:ln w="9525" algn="ctr">
+            <a:noFill/>
+            <a:miter lim="800000"/>
+            <a:headEnd/>
+            <a:tailEnd/>
+          </a:ln>
+        </p:spPr>
+        <p:txBody>
+          <a:bodyPr>
+            <a:spAutoFit/>
+          </a:bodyPr>
+          <a:lstStyle/>
+          <a:p>
+            <a:pPr marL="685800" indent="-685800"/>
+            <a:r>
+              <a:rPr lang="en-US" sz="2200">
+                <a:solidFill>
+                  <a:schemeClr val="bg2"/>
+                </a:solidFill>
+                <a:latin typeface="Courier New" pitchFamily="49" charset="0"/>
+              </a:rPr>
+              <a:t>${DSM2INPUTDIR}</a:t>
+            </a:r>
+          </a:p>
+        </p:txBody>
+      </p:sp>
+    </p:spTree>
+  </p:cSld>
+  <p:clrMapOvr>
+    <a:masterClrMapping/>
+  </p:clrMapOvr>
+  <p:transition/>
+</p:sld>
+</file>
+
+<file path=ppt/slides/slide11.xml><?xml version="1.0" encoding="utf-8"?>
+<p:sld xmlns:a="http://schemas.openxmlformats.org/drawingml/2006/main" xmlns:r="http://schemas.openxmlformats.org/officeDocument/2006/relationships" xmlns:p="http://schemas.openxmlformats.org/presentationml/2006/main">
+  <p:cSld>
+    <p:spTree>
+      <p:nvGrpSpPr>
+        <p:cNvPr id="1" name=""/>
+        <p:cNvGrpSpPr/>
+        <p:nvPr/>
+      </p:nvGrpSpPr>
+      <p:grpSpPr>
+        <a:xfrm>
+          <a:off x="0" y="0"/>
+          <a:ext cx="0" cy="0"/>
+          <a:chOff x="0" y="0"/>
+          <a:chExt cx="0" cy="0"/>
+        </a:xfrm>
+      </p:grpSpPr>
+      <p:sp>
+        <p:nvSpPr>
           <p:cNvPr id="5" name="Title 4"/>
           <p:cNvSpPr>
             <a:spLocks noGrp="1"/>
@@ -4462,7 +4871,7 @@
               <a:pPr>
                 <a:defRPr/>
               </a:pPr>
-              <a:t>10</a:t>
+              <a:t>11</a:t>
             </a:fld>
             <a:endParaRPr lang="en-US"/>
           </a:p>
@@ -4542,8 +4951,8 @@
         </p:nvGrpSpPr>
         <p:grpSpPr>
           <a:xfrm>
-            <a:off x="209228" y="2665702"/>
-            <a:ext cx="8694549" cy="4027747"/>
+            <a:off x="304800" y="2815771"/>
+            <a:ext cx="8598977" cy="3877678"/>
             <a:chOff x="216976" y="1845131"/>
             <a:chExt cx="8733295" cy="4174155"/>
           </a:xfrm>
@@ -4603,15 +5012,7 @@
                       <a:schemeClr val="bg2"/>
                     </a:solidFill>
                   </a:rPr>
-                  <a:t>&lt;ptm</a:t>
-                </a:r>
-                <a:r>
-                  <a:rPr lang="en-US" sz="1800" dirty="0" smtClean="0">
-                    <a:solidFill>
-                      <a:schemeClr val="bg2"/>
-                    </a:solidFill>
-                  </a:rPr>
-                  <a:t>.inp&gt;</a:t>
+                  <a:t>&lt;ptm.inp&gt;</a:t>
                 </a:r>
                 <a:endParaRPr lang="en-US" sz="1800" dirty="0">
                   <a:solidFill>
@@ -4878,23 +5279,7 @@
                         <a:schemeClr val="bg2"/>
                       </a:solidFill>
                     </a:rPr>
-                    <a:t>&lt;</a:t>
-                  </a:r>
-                  <a:r>
-                    <a:rPr lang="en-US" sz="1800" dirty="0" smtClean="0">
-                      <a:solidFill>
-                        <a:schemeClr val="bg2"/>
-                      </a:solidFill>
-                    </a:rPr>
-                    <a:t>hydro</a:t>
-                  </a:r>
-                  <a:r>
-                    <a:rPr lang="en-US" sz="1800" dirty="0" smtClean="0">
-                      <a:solidFill>
-                        <a:schemeClr val="bg2"/>
-                      </a:solidFill>
-                    </a:rPr>
-                    <a:t>.inp&gt;</a:t>
+                    <a:t>&lt;hydro.inp&gt;</a:t>
                   </a:r>
                   <a:endParaRPr lang="en-US" sz="1800" dirty="0">
                     <a:solidFill>
@@ -5329,15 +5714,7 @@
                         <a:schemeClr val="bg2"/>
                       </a:solidFill>
                     </a:rPr>
-                    <a:t>&lt;q</a:t>
-                  </a:r>
-                  <a:r>
-                    <a:rPr lang="en-US" sz="1800" dirty="0" smtClean="0">
-                      <a:solidFill>
-                        <a:schemeClr val="bg2"/>
-                      </a:solidFill>
-                    </a:rPr>
-                    <a:t>ual.inp&gt;</a:t>
+                    <a:t>&lt;qual.inp&gt;</a:t>
                   </a:r>
                   <a:endParaRPr lang="en-US" sz="1800" dirty="0">
                     <a:solidFill>
@@ -5389,15 +5766,7 @@
                       <a:schemeClr val="bg2"/>
                     </a:solidFill>
                   </a:rPr>
-                  <a:t>&lt;ptm</a:t>
-                </a:r>
-                <a:r>
-                  <a:rPr lang="en-US" sz="1800" dirty="0" smtClean="0">
-                    <a:solidFill>
-                      <a:schemeClr val="bg2"/>
-                    </a:solidFill>
-                  </a:rPr>
-                  <a:t>.inp&gt;</a:t>
+                  <a:t>&lt;ptm.inp&gt;</a:t>
                 </a:r>
                 <a:endParaRPr lang="en-US" sz="1800" dirty="0">
                   <a:solidFill>
@@ -5448,15 +5817,7 @@
                       <a:schemeClr val="bg2"/>
                     </a:solidFill>
                   </a:rPr>
-                  <a:t>&lt;config</a:t>
-                </a:r>
-                <a:r>
-                  <a:rPr lang="en-US" sz="1800" dirty="0" smtClean="0">
-                    <a:solidFill>
-                      <a:schemeClr val="bg2"/>
-                    </a:solidFill>
-                  </a:rPr>
-                  <a:t>.inp&gt;</a:t>
+                  <a:t>&lt;config.inp&gt;</a:t>
                 </a:r>
                 <a:endParaRPr lang="en-US" sz="1800" dirty="0">
                   <a:solidFill>
@@ -5538,18 +5899,6 @@
                 </a:rPr>
                 <a:t>Reused</a:t>
               </a:r>
-              <a:endParaRPr kumimoji="0" lang="en-US" sz="2400" b="1" i="0" u="none" strike="noStrike" cap="none" normalizeH="0" baseline="0" dirty="0" smtClean="0">
-                <a:ln>
-                  <a:noFill/>
-                </a:ln>
-                <a:solidFill>
-                  <a:schemeClr val="bg1">
-                    <a:lumMod val="50000"/>
-                  </a:schemeClr>
-                </a:solidFill>
-                <a:effectLst/>
-                <a:latin typeface="Arial" charset="0"/>
-              </a:endParaRPr>
             </a:p>
           </p:txBody>
         </p:sp>
@@ -5563,7 +5912,7 @@
 </p:sld>
 </file>
 
-<file path=ppt/slides/slide11.xml><?xml version="1.0" encoding="utf-8"?>
+<file path=ppt/slides/slide12.xml><?xml version="1.0" encoding="utf-8"?>
 <p:sld xmlns:a="http://schemas.openxmlformats.org/drawingml/2006/main" xmlns:r="http://schemas.openxmlformats.org/officeDocument/2006/relationships" xmlns:p="http://schemas.openxmlformats.org/presentationml/2006/main">
   <p:cSld>
     <p:spTree>
@@ -5686,7 +6035,7 @@
 </p:sld>
 </file>
 
-<file path=ppt/slides/slide12.xml><?xml version="1.0" encoding="utf-8"?>
+<file path=ppt/slides/slide13.xml><?xml version="1.0" encoding="utf-8"?>
 <p:sld xmlns:a="http://schemas.openxmlformats.org/drawingml/2006/main" xmlns:r="http://schemas.openxmlformats.org/officeDocument/2006/relationships" xmlns:p="http://schemas.openxmlformats.org/presentationml/2006/main">
   <p:cSld>
     <p:spTree>
@@ -5968,7 +6317,7 @@
 </p:sld>
 </file>
 
-<file path=ppt/slides/slide13.xml><?xml version="1.0" encoding="utf-8"?>
+<file path=ppt/slides/slide14.xml><?xml version="1.0" encoding="utf-8"?>
 <p:sld xmlns:a="http://schemas.openxmlformats.org/drawingml/2006/main" xmlns:r="http://schemas.openxmlformats.org/officeDocument/2006/relationships" xmlns:p="http://schemas.openxmlformats.org/presentationml/2006/main">
   <p:cSld>
     <p:spTree>
@@ -6043,11 +6392,7 @@
           <a:p>
             <a:r>
               <a:rPr lang="en-US" dirty="0" smtClean="0"/>
-              <a:t>Table structure is </a:t>
-            </a:r>
-            <a:r>
-              <a:rPr lang="en-US" dirty="0" smtClean="0"/>
-              <a:t>fixed</a:t>
+              <a:t>Table structure is fixed</a:t>
             </a:r>
           </a:p>
           <a:p>
@@ -6055,7 +6400,6 @@
               <a:rPr lang="en-US" dirty="0" smtClean="0"/>
               <a:t>Configuration files are include blocks</a:t>
             </a:r>
-            <a:endParaRPr lang="en-US" dirty="0" smtClean="0"/>
           </a:p>
           <a:p>
             <a:r>
@@ -8637,18 +8981,41 @@
       </p:grpSpPr>
       <p:sp>
         <p:nvSpPr>
-          <p:cNvPr id="29697" name="Rectangle 2"/>
-          <p:cNvSpPr>
-            <a:spLocks noGrp="1" noChangeArrowheads="1"/>
+          <p:cNvPr id="2" name="Title 1"/>
+          <p:cNvSpPr>
+            <a:spLocks noGrp="1"/>
           </p:cNvSpPr>
           <p:nvPr>
             <p:ph type="title"/>
           </p:nvPr>
         </p:nvSpPr>
+        <p:spPr/>
+        <p:txBody>
+          <a:bodyPr/>
+          <a:lstStyle/>
+          <a:p>
+            <a:r>
+              <a:rPr lang="en-US" dirty="0" smtClean="0"/>
+              <a:t>Echo Input File</a:t>
+            </a:r>
+            <a:endParaRPr lang="en-US" dirty="0"/>
+          </a:p>
+        </p:txBody>
+      </p:sp>
+      <p:sp>
+        <p:nvSpPr>
+          <p:cNvPr id="3" name="Content Placeholder 2"/>
+          <p:cNvSpPr>
+            <a:spLocks noGrp="1"/>
+          </p:cNvSpPr>
+          <p:nvPr>
+            <p:ph idx="1"/>
+          </p:nvPr>
+        </p:nvSpPr>
         <p:spPr>
           <a:xfrm>
-            <a:off x="685800" y="323850"/>
-            <a:ext cx="7870825" cy="1143000"/>
+            <a:off x="344385" y="1360714"/>
+            <a:ext cx="8799616" cy="4114800"/>
           </a:xfrm>
         </p:spPr>
         <p:txBody>
@@ -8656,373 +9023,187 @@
           <a:lstStyle/>
           <a:p>
             <a:r>
-              <a:rPr lang="en-US" smtClean="0"/>
-              <a:t>ENVVAR: Text Substitution</a:t>
-            </a:r>
+              <a:rPr lang="en-US" dirty="0" smtClean="0"/>
+              <a:t>Archive of run</a:t>
+            </a:r>
+          </a:p>
+          <a:p>
+            <a:r>
+              <a:rPr lang="en-US" dirty="0" smtClean="0"/>
+              <a:t>QA/QC: </a:t>
+            </a:r>
+            <a:r>
+              <a:rPr lang="en-US" dirty="0" smtClean="0"/>
+              <a:t>combined view </a:t>
+            </a:r>
+            <a:r>
+              <a:rPr lang="en-US" dirty="0" smtClean="0"/>
+              <a:t>of multiple </a:t>
+            </a:r>
+            <a:r>
+              <a:rPr lang="en-US" dirty="0" smtClean="0"/>
+              <a:t>input files</a:t>
+            </a:r>
+            <a:endParaRPr lang="en-US" dirty="0" smtClean="0"/>
+          </a:p>
+          <a:p>
+            <a:r>
+              <a:rPr lang="en-US" dirty="0" smtClean="0"/>
+              <a:t>Can be used as an input file</a:t>
+            </a:r>
+          </a:p>
+          <a:p>
+            <a:endParaRPr lang="en-US" dirty="0" smtClean="0"/>
           </a:p>
         </p:txBody>
       </p:sp>
       <p:sp>
         <p:nvSpPr>
-          <p:cNvPr id="29698" name="Rectangle 3"/>
-          <p:cNvSpPr>
-            <a:spLocks noGrp="1" noChangeArrowheads="1"/>
+          <p:cNvPr id="4" name="Date Placeholder 3"/>
+          <p:cNvSpPr>
+            <a:spLocks noGrp="1"/>
           </p:cNvSpPr>
           <p:nvPr>
-            <p:ph type="body" idx="1"/>
+            <p:ph type="dt" sz="half" idx="10"/>
           </p:nvPr>
         </p:nvSpPr>
-        <p:spPr>
-          <a:xfrm>
-            <a:off x="300038" y="1362075"/>
-            <a:ext cx="8664575" cy="5059363"/>
-          </a:xfrm>
-        </p:spPr>
+        <p:spPr/>
         <p:txBody>
           <a:bodyPr/>
           <a:lstStyle/>
           <a:p>
-            <a:pPr>
-              <a:lnSpc>
-                <a:spcPct val="80000"/>
-              </a:lnSpc>
-            </a:pPr>
-            <a:r>
-              <a:rPr lang="en-US" sz="2600" smtClean="0"/>
-              <a:t>Used for flexibility…avoids multiple files and erasing</a:t>
-            </a:r>
-          </a:p>
-          <a:p>
-            <a:pPr>
-              <a:lnSpc>
-                <a:spcPct val="80000"/>
-              </a:lnSpc>
-            </a:pPr>
-            <a:r>
-              <a:rPr lang="en-US" sz="2600" smtClean="0"/>
-              <a:t>Define in ENVVAR table (or OS environment):</a:t>
-            </a:r>
-          </a:p>
-          <a:p>
-            <a:pPr>
-              <a:lnSpc>
-                <a:spcPct val="80000"/>
-              </a:lnSpc>
-            </a:pPr>
-            <a:endParaRPr lang="en-US" sz="2600" smtClean="0"/>
-          </a:p>
-          <a:p>
-            <a:pPr>
-              <a:lnSpc>
-                <a:spcPct val="80000"/>
-              </a:lnSpc>
-            </a:pPr>
-            <a:endParaRPr lang="en-US" sz="2600" smtClean="0"/>
-          </a:p>
-          <a:p>
-            <a:pPr>
-              <a:lnSpc>
-                <a:spcPct val="80000"/>
-              </a:lnSpc>
-            </a:pPr>
-            <a:endParaRPr lang="en-US" sz="2600" smtClean="0"/>
-          </a:p>
-          <a:p>
-            <a:pPr>
-              <a:lnSpc>
-                <a:spcPct val="80000"/>
-              </a:lnSpc>
-            </a:pPr>
-            <a:endParaRPr lang="en-US" sz="2600" smtClean="0"/>
-          </a:p>
-          <a:p>
-            <a:pPr>
-              <a:lnSpc>
-                <a:spcPct val="80000"/>
-              </a:lnSpc>
-            </a:pPr>
-            <a:endParaRPr lang="en-US" sz="2600" smtClean="0"/>
-          </a:p>
-          <a:p>
-            <a:pPr>
-              <a:lnSpc>
-                <a:spcPct val="80000"/>
-              </a:lnSpc>
-            </a:pPr>
-            <a:endParaRPr lang="en-US" sz="2600" smtClean="0"/>
-          </a:p>
-          <a:p>
-            <a:pPr>
-              <a:lnSpc>
-                <a:spcPct val="80000"/>
-              </a:lnSpc>
-            </a:pPr>
-            <a:endParaRPr lang="en-US" sz="2600" smtClean="0"/>
-          </a:p>
-          <a:p>
-            <a:pPr>
-              <a:lnSpc>
-                <a:spcPct val="80000"/>
-              </a:lnSpc>
-            </a:pPr>
-            <a:r>
-              <a:rPr lang="en-US" sz="2600" smtClean="0"/>
-              <a:t>Subject to layering</a:t>
-            </a:r>
-          </a:p>
-          <a:p>
-            <a:pPr>
-              <a:lnSpc>
-                <a:spcPct val="80000"/>
-              </a:lnSpc>
-            </a:pPr>
-            <a:r>
-              <a:rPr lang="en-US" sz="2600" smtClean="0"/>
-              <a:t>Use anywhere else using ${ }:   </a:t>
-            </a:r>
-          </a:p>
-          <a:p>
-            <a:pPr>
-              <a:lnSpc>
-                <a:spcPct val="80000"/>
-              </a:lnSpc>
-            </a:pPr>
-            <a:r>
-              <a:rPr lang="en-US" sz="2600" smtClean="0"/>
-              <a:t>Nesting and interdependency allowed.</a:t>
-            </a:r>
-          </a:p>
-          <a:p>
-            <a:pPr>
-              <a:lnSpc>
-                <a:spcPct val="80000"/>
-              </a:lnSpc>
-            </a:pPr>
-            <a:endParaRPr lang="en-US" sz="2600" smtClean="0"/>
-          </a:p>
-          <a:p>
-            <a:pPr>
-              <a:lnSpc>
-                <a:spcPct val="80000"/>
-              </a:lnSpc>
-            </a:pPr>
-            <a:endParaRPr lang="en-US" sz="2600" smtClean="0"/>
-          </a:p>
-          <a:p>
-            <a:pPr>
-              <a:lnSpc>
-                <a:spcPct val="80000"/>
-              </a:lnSpc>
-              <a:buFontTx/>
-              <a:buNone/>
-            </a:pPr>
-            <a:endParaRPr lang="en-US" sz="2400" smtClean="0"/>
+            <a:fld id="{AB98F214-5D90-468C-9EE8-E1612B8D2BE2}" type="slidenum">
+              <a:rPr lang="en-US" smtClean="0"/>
+              <a:pPr/>
+              <a:t>9</a:t>
+            </a:fld>
+            <a:endParaRPr lang="en-US"/>
           </a:p>
         </p:txBody>
       </p:sp>
-      <p:sp>
-        <p:nvSpPr>
-          <p:cNvPr id="29699" name="Rectangle 4"/>
-          <p:cNvSpPr>
-            <a:spLocks noChangeArrowheads="1"/>
-          </p:cNvSpPr>
+      <p:grpSp>
+        <p:nvGrpSpPr>
+          <p:cNvPr id="7" name="Group 6"/>
+          <p:cNvGrpSpPr/>
           <p:nvPr/>
-        </p:nvSpPr>
-        <p:spPr bwMode="auto">
+        </p:nvGrpSpPr>
+        <p:grpSpPr>
           <a:xfrm>
-            <a:off x="1455738" y="2981325"/>
-            <a:ext cx="4572000" cy="641350"/>
+            <a:off x="1082255" y="3383891"/>
+            <a:ext cx="6591300" cy="3267075"/>
+            <a:chOff x="1082255" y="3383891"/>
+            <a:chExt cx="6591300" cy="3267075"/>
           </a:xfrm>
-          <a:prstGeom prst="rect">
-            <a:avLst/>
-          </a:prstGeom>
-          <a:noFill/>
-          <a:ln w="9525">
+        </p:grpSpPr>
+        <p:pic>
+          <p:nvPicPr>
+            <p:cNvPr id="5" name="Picture 3"/>
+            <p:cNvPicPr>
+              <a:picLocks noChangeAspect="1" noChangeArrowheads="1"/>
+            </p:cNvPicPr>
+            <p:nvPr/>
+          </p:nvPicPr>
+          <p:blipFill>
+            <a:blip r:embed="rId2" cstate="print"/>
+            <a:srcRect/>
+            <a:stretch>
+              <a:fillRect/>
+            </a:stretch>
+          </p:blipFill>
+          <p:spPr bwMode="auto">
+            <a:xfrm>
+              <a:off x="1082255" y="3383891"/>
+              <a:ext cx="6591300" cy="3267075"/>
+            </a:xfrm>
+            <a:prstGeom prst="rect">
+              <a:avLst/>
+            </a:prstGeom>
             <a:noFill/>
-            <a:miter lim="800000"/>
-            <a:headEnd/>
-            <a:tailEnd/>
-          </a:ln>
-        </p:spPr>
-        <p:txBody>
-          <a:bodyPr>
-            <a:spAutoFit/>
-          </a:bodyPr>
-          <a:lstStyle/>
-          <a:p>
-            <a:pPr marL="685800" indent="-685800"/>
-            <a:endParaRPr lang="en-US"/>
-          </a:p>
-        </p:txBody>
-      </p:sp>
-      <p:sp>
-        <p:nvSpPr>
-          <p:cNvPr id="29700" name="Rectangle 5"/>
-          <p:cNvSpPr>
-            <a:spLocks noChangeArrowheads="1"/>
-          </p:cNvSpPr>
-          <p:nvPr/>
-        </p:nvSpPr>
-        <p:spPr bwMode="auto">
-          <a:xfrm>
-            <a:off x="1019175" y="2262188"/>
-            <a:ext cx="7448550" cy="2436812"/>
-          </a:xfrm>
-          <a:prstGeom prst="rect">
-            <a:avLst/>
-          </a:prstGeom>
-          <a:solidFill>
-            <a:srgbClr val="CCFFCC"/>
-          </a:solidFill>
-          <a:ln w="9525">
+            <a:ln w="9525">
+              <a:noFill/>
+              <a:miter lim="800000"/>
+              <a:headEnd/>
+              <a:tailEnd/>
+            </a:ln>
+          </p:spPr>
+        </p:pic>
+        <p:sp>
+          <p:nvSpPr>
+            <p:cNvPr id="6" name="Oval 5"/>
+            <p:cNvSpPr/>
+            <p:nvPr/>
+          </p:nvSpPr>
+          <p:spPr bwMode="auto">
+            <a:xfrm>
+              <a:off x="1713017" y="5489369"/>
+              <a:ext cx="5519056" cy="250371"/>
+            </a:xfrm>
+            <a:prstGeom prst="ellipse">
+              <a:avLst/>
+            </a:prstGeom>
             <a:noFill/>
-            <a:miter lim="800000"/>
-            <a:headEnd/>
-            <a:tailEnd/>
-          </a:ln>
-        </p:spPr>
-        <p:txBody>
-          <a:bodyPr>
-            <a:spAutoFit/>
-          </a:bodyPr>
-          <a:lstStyle/>
-          <a:p>
-            <a:pPr marL="685800" indent="-685800"/>
-            <a:r>
-              <a:rPr lang="en-US" sz="2200">
+            <a:ln w="19050" cap="flat" cmpd="sng" algn="ctr">
+              <a:solidFill>
+                <a:srgbClr val="C00000"/>
+              </a:solidFill>
+              <a:prstDash val="solid"/>
+              <a:round/>
+              <a:headEnd type="none" w="med" len="med"/>
+              <a:tailEnd type="none" w="med" len="med"/>
+            </a:ln>
+            <a:effectLst/>
+          </p:spPr>
+          <p:txBody>
+            <a:bodyPr vert="horz" wrap="square" lIns="91440" tIns="45720" rIns="91440" bIns="45720" numCol="1" rtlCol="0" anchor="ctr" anchorCtr="0" compatLnSpc="1">
+              <a:prstTxWarp prst="textNoShape">
+                <a:avLst/>
+              </a:prstTxWarp>
+            </a:bodyPr>
+            <a:lstStyle/>
+            <a:p>
+              <a:pPr marL="0" marR="0" indent="0" algn="ctr" defTabSz="914400" rtl="0" eaLnBrk="0" fontAlgn="base" latinLnBrk="0" hangingPunct="0">
+                <a:lnSpc>
+                  <a:spcPct val="100000"/>
+                </a:lnSpc>
+                <a:spcBef>
+                  <a:spcPct val="0"/>
+                </a:spcBef>
+                <a:spcAft>
+                  <a:spcPct val="0"/>
+                </a:spcAft>
+                <a:buClrTx/>
+                <a:buSzTx/>
+                <a:buFontTx/>
+                <a:buNone/>
+                <a:tabLst/>
+              </a:pPr>
+              <a:endParaRPr kumimoji="0" lang="en-US" sz="3600" b="1" i="0" u="none" strike="noStrike" cap="none" normalizeH="0" baseline="0" smtClean="0">
+                <a:ln>
+                  <a:noFill/>
+                </a:ln>
                 <a:solidFill>
-                  <a:schemeClr val="bg2"/>
+                  <a:schemeClr val="tx1"/>
                 </a:solidFill>
-                <a:latin typeface="Courier New" pitchFamily="49" charset="0"/>
-              </a:rPr>
-              <a:t>ENVVAR</a:t>
-            </a:r>
-          </a:p>
-          <a:p>
-            <a:pPr marL="685800" indent="-685800"/>
-            <a:r>
-              <a:rPr lang="en-US" sz="2200">
-                <a:solidFill>
-                  <a:schemeClr val="bg2"/>
-                </a:solidFill>
-                <a:latin typeface="Courier New" pitchFamily="49" charset="0"/>
-              </a:rPr>
-              <a:t>NAME             VALUE</a:t>
-            </a:r>
-          </a:p>
-          <a:p>
-            <a:pPr marL="685800" indent="-685800"/>
-            <a:r>
-              <a:rPr lang="en-US" sz="2200">
-                <a:solidFill>
-                  <a:schemeClr val="bg2"/>
-                </a:solidFill>
-                <a:latin typeface="Courier New" pitchFamily="49" charset="0"/>
-              </a:rPr>
-              <a:t>DSM2INPUTDIR     ${DSM2_HOME}/common_input</a:t>
-            </a:r>
-          </a:p>
-          <a:p>
-            <a:pPr marL="685800" indent="-685800"/>
-            <a:r>
-              <a:rPr lang="en-US" sz="2200">
-                <a:solidFill>
-                  <a:schemeClr val="bg2"/>
-                </a:solidFill>
-                <a:latin typeface="Courier New" pitchFamily="49" charset="0"/>
-              </a:rPr>
-              <a:t>START_DATE       01JAN1990</a:t>
-            </a:r>
-          </a:p>
-          <a:p>
-            <a:pPr marL="685800" indent="-685800"/>
-            <a:r>
-              <a:rPr lang="en-US" sz="2200">
-                <a:solidFill>
-                  <a:schemeClr val="bg2"/>
-                </a:solidFill>
-                <a:latin typeface="Courier New" pitchFamily="49" charset="0"/>
-              </a:rPr>
-              <a:t>STUDYDIR         .</a:t>
-            </a:r>
-          </a:p>
-          <a:p>
-            <a:pPr marL="685800" indent="-685800"/>
-            <a:r>
-              <a:rPr lang="en-US" sz="2200">
-                <a:solidFill>
-                  <a:schemeClr val="bg2"/>
-                </a:solidFill>
-                <a:latin typeface="Courier New" pitchFamily="49" charset="0"/>
-              </a:rPr>
-              <a:t>OUTPUT           ${STUDYDIR}/output</a:t>
-            </a:r>
-          </a:p>
-          <a:p>
-            <a:pPr marL="685800" indent="-685800"/>
-            <a:r>
-              <a:rPr lang="en-US" sz="2200">
-                <a:solidFill>
-                  <a:schemeClr val="bg2"/>
-                </a:solidFill>
-                <a:latin typeface="Courier New" pitchFamily="49" charset="0"/>
-              </a:rPr>
-              <a:t>END</a:t>
-            </a:r>
-          </a:p>
-        </p:txBody>
-      </p:sp>
-      <p:sp>
-        <p:nvSpPr>
-          <p:cNvPr id="29701" name="Text Box 6"/>
-          <p:cNvSpPr txBox="1">
-            <a:spLocks noChangeArrowheads="1"/>
-          </p:cNvSpPr>
-          <p:nvPr/>
-        </p:nvSpPr>
-        <p:spPr bwMode="auto">
-          <a:xfrm>
-            <a:off x="5357813" y="5330825"/>
-            <a:ext cx="2927350" cy="427038"/>
-          </a:xfrm>
-          <a:prstGeom prst="rect">
-            <a:avLst/>
-          </a:prstGeom>
-          <a:solidFill>
-            <a:srgbClr val="CCFFCC"/>
-          </a:solidFill>
-          <a:ln w="9525" algn="ctr">
-            <a:noFill/>
-            <a:miter lim="800000"/>
-            <a:headEnd/>
-            <a:tailEnd/>
-          </a:ln>
-        </p:spPr>
-        <p:txBody>
-          <a:bodyPr>
-            <a:spAutoFit/>
-          </a:bodyPr>
-          <a:lstStyle/>
-          <a:p>
-            <a:pPr marL="685800" indent="-685800"/>
-            <a:r>
-              <a:rPr lang="en-US" sz="2200">
-                <a:solidFill>
-                  <a:schemeClr val="bg2"/>
-                </a:solidFill>
-                <a:latin typeface="Courier New" pitchFamily="49" charset="0"/>
-              </a:rPr>
-              <a:t>${DSM2INPUTDIR}</a:t>
-            </a:r>
-          </a:p>
-        </p:txBody>
-      </p:sp>
+                <a:effectLst/>
+                <a:latin typeface="Arial" charset="0"/>
+              </a:endParaRPr>
+            </a:p>
+          </p:txBody>
+        </p:sp>
+      </p:grpSp>
     </p:spTree>
   </p:cSld>
   <p:clrMapOvr>
     <a:masterClrMapping/>
   </p:clrMapOvr>
-  <p:transition/>
+  <p:transition advClick="0" advTm="0"/>
+  <p:timing>
+    <p:tnLst>
+      <p:par>
+        <p:cTn id="1" dur="indefinite" restart="never" nodeType="tmRoot"/>
+      </p:par>
+    </p:tnLst>
+  </p:timing>
 </p:sld>
 </file>
 

</xml_diff>